<commit_message>
organization and predict-observe updates
</commit_message>
<xml_diff>
--- a/Resources icons.pptx
+++ b/Resources icons.pptx
@@ -7923,436 +7923,6 @@
           </a:p>
         </p:txBody>
       </p:sp>
-      <p:cxnSp>
-        <p:nvCxnSpPr>
-          <p:cNvPr id="17" name="Straight Connector 16">
-            <a:extLst>
-              <a:ext uri="{FF2B5EF4-FFF2-40B4-BE49-F238E27FC236}">
-                <a16:creationId xmlns:a16="http://schemas.microsoft.com/office/drawing/2014/main" id="{FE659593-4B7C-4C45-93E2-FF29963A5E98}"/>
-              </a:ext>
-            </a:extLst>
-          </p:cNvPr>
-          <p:cNvCxnSpPr/>
-          <p:nvPr/>
-        </p:nvCxnSpPr>
-        <p:spPr>
-          <a:xfrm>
-            <a:off x="688765" y="888124"/>
-            <a:ext cx="1413304" cy="0"/>
-          </a:xfrm>
-          <a:prstGeom prst="line">
-            <a:avLst/>
-          </a:prstGeom>
-          <a:ln>
-            <a:solidFill>
-              <a:schemeClr val="bg2">
-                <a:lumMod val="90000"/>
-              </a:schemeClr>
-            </a:solidFill>
-          </a:ln>
-        </p:spPr>
-        <p:style>
-          <a:lnRef idx="1">
-            <a:schemeClr val="accent1"/>
-          </a:lnRef>
-          <a:fillRef idx="0">
-            <a:schemeClr val="accent1"/>
-          </a:fillRef>
-          <a:effectRef idx="0">
-            <a:schemeClr val="accent1"/>
-          </a:effectRef>
-          <a:fontRef idx="minor">
-            <a:schemeClr val="tx1"/>
-          </a:fontRef>
-        </p:style>
-      </p:cxnSp>
-      <p:cxnSp>
-        <p:nvCxnSpPr>
-          <p:cNvPr id="18" name="Straight Connector 17">
-            <a:extLst>
-              <a:ext uri="{FF2B5EF4-FFF2-40B4-BE49-F238E27FC236}">
-                <a16:creationId xmlns:a16="http://schemas.microsoft.com/office/drawing/2014/main" id="{2E59BAD4-BFBE-FF40-8A9F-845E71EBE377}"/>
-              </a:ext>
-            </a:extLst>
-          </p:cNvPr>
-          <p:cNvCxnSpPr/>
-          <p:nvPr/>
-        </p:nvCxnSpPr>
-        <p:spPr>
-          <a:xfrm>
-            <a:off x="688765" y="1056289"/>
-            <a:ext cx="1413304" cy="0"/>
-          </a:xfrm>
-          <a:prstGeom prst="line">
-            <a:avLst/>
-          </a:prstGeom>
-          <a:ln>
-            <a:solidFill>
-              <a:schemeClr val="bg2">
-                <a:lumMod val="90000"/>
-              </a:schemeClr>
-            </a:solidFill>
-          </a:ln>
-        </p:spPr>
-        <p:style>
-          <a:lnRef idx="1">
-            <a:schemeClr val="accent1"/>
-          </a:lnRef>
-          <a:fillRef idx="0">
-            <a:schemeClr val="accent1"/>
-          </a:fillRef>
-          <a:effectRef idx="0">
-            <a:schemeClr val="accent1"/>
-          </a:effectRef>
-          <a:fontRef idx="minor">
-            <a:schemeClr val="tx1"/>
-          </a:fontRef>
-        </p:style>
-      </p:cxnSp>
-      <p:cxnSp>
-        <p:nvCxnSpPr>
-          <p:cNvPr id="19" name="Straight Connector 18">
-            <a:extLst>
-              <a:ext uri="{FF2B5EF4-FFF2-40B4-BE49-F238E27FC236}">
-                <a16:creationId xmlns:a16="http://schemas.microsoft.com/office/drawing/2014/main" id="{7BB0CAF7-1052-A14D-91DE-D87844D29DCE}"/>
-              </a:ext>
-            </a:extLst>
-          </p:cNvPr>
-          <p:cNvCxnSpPr/>
-          <p:nvPr/>
-        </p:nvCxnSpPr>
-        <p:spPr>
-          <a:xfrm>
-            <a:off x="688765" y="1213945"/>
-            <a:ext cx="1413304" cy="0"/>
-          </a:xfrm>
-          <a:prstGeom prst="line">
-            <a:avLst/>
-          </a:prstGeom>
-          <a:ln>
-            <a:solidFill>
-              <a:schemeClr val="bg2">
-                <a:lumMod val="90000"/>
-              </a:schemeClr>
-            </a:solidFill>
-          </a:ln>
-        </p:spPr>
-        <p:style>
-          <a:lnRef idx="1">
-            <a:schemeClr val="accent1"/>
-          </a:lnRef>
-          <a:fillRef idx="0">
-            <a:schemeClr val="accent1"/>
-          </a:fillRef>
-          <a:effectRef idx="0">
-            <a:schemeClr val="accent1"/>
-          </a:effectRef>
-          <a:fontRef idx="minor">
-            <a:schemeClr val="tx1"/>
-          </a:fontRef>
-        </p:style>
-      </p:cxnSp>
-      <p:cxnSp>
-        <p:nvCxnSpPr>
-          <p:cNvPr id="20" name="Straight Connector 19">
-            <a:extLst>
-              <a:ext uri="{FF2B5EF4-FFF2-40B4-BE49-F238E27FC236}">
-                <a16:creationId xmlns:a16="http://schemas.microsoft.com/office/drawing/2014/main" id="{8F75C154-D24F-DC45-801E-B1B868E85BC0}"/>
-              </a:ext>
-            </a:extLst>
-          </p:cNvPr>
-          <p:cNvCxnSpPr/>
-          <p:nvPr/>
-        </p:nvCxnSpPr>
-        <p:spPr>
-          <a:xfrm>
-            <a:off x="688765" y="1376855"/>
-            <a:ext cx="1413304" cy="0"/>
-          </a:xfrm>
-          <a:prstGeom prst="line">
-            <a:avLst/>
-          </a:prstGeom>
-          <a:ln>
-            <a:solidFill>
-              <a:schemeClr val="bg2">
-                <a:lumMod val="90000"/>
-              </a:schemeClr>
-            </a:solidFill>
-          </a:ln>
-        </p:spPr>
-        <p:style>
-          <a:lnRef idx="1">
-            <a:schemeClr val="accent1"/>
-          </a:lnRef>
-          <a:fillRef idx="0">
-            <a:schemeClr val="accent1"/>
-          </a:fillRef>
-          <a:effectRef idx="0">
-            <a:schemeClr val="accent1"/>
-          </a:effectRef>
-          <a:fontRef idx="minor">
-            <a:schemeClr val="tx1"/>
-          </a:fontRef>
-        </p:style>
-      </p:cxnSp>
-      <p:cxnSp>
-        <p:nvCxnSpPr>
-          <p:cNvPr id="21" name="Straight Connector 20">
-            <a:extLst>
-              <a:ext uri="{FF2B5EF4-FFF2-40B4-BE49-F238E27FC236}">
-                <a16:creationId xmlns:a16="http://schemas.microsoft.com/office/drawing/2014/main" id="{9A18BD41-62B4-6644-B0DA-9B59B457AC7A}"/>
-              </a:ext>
-            </a:extLst>
-          </p:cNvPr>
-          <p:cNvCxnSpPr/>
-          <p:nvPr/>
-        </p:nvCxnSpPr>
-        <p:spPr>
-          <a:xfrm>
-            <a:off x="688765" y="1545020"/>
-            <a:ext cx="1413304" cy="0"/>
-          </a:xfrm>
-          <a:prstGeom prst="line">
-            <a:avLst/>
-          </a:prstGeom>
-          <a:ln>
-            <a:solidFill>
-              <a:schemeClr val="bg2">
-                <a:lumMod val="90000"/>
-              </a:schemeClr>
-            </a:solidFill>
-          </a:ln>
-        </p:spPr>
-        <p:style>
-          <a:lnRef idx="1">
-            <a:schemeClr val="accent1"/>
-          </a:lnRef>
-          <a:fillRef idx="0">
-            <a:schemeClr val="accent1"/>
-          </a:fillRef>
-          <a:effectRef idx="0">
-            <a:schemeClr val="accent1"/>
-          </a:effectRef>
-          <a:fontRef idx="minor">
-            <a:schemeClr val="tx1"/>
-          </a:fontRef>
-        </p:style>
-      </p:cxnSp>
-      <p:cxnSp>
-        <p:nvCxnSpPr>
-          <p:cNvPr id="22" name="Straight Connector 21">
-            <a:extLst>
-              <a:ext uri="{FF2B5EF4-FFF2-40B4-BE49-F238E27FC236}">
-                <a16:creationId xmlns:a16="http://schemas.microsoft.com/office/drawing/2014/main" id="{8EB46669-A94B-D648-8CD6-2F37410385B3}"/>
-              </a:ext>
-            </a:extLst>
-          </p:cNvPr>
-          <p:cNvCxnSpPr/>
-          <p:nvPr/>
-        </p:nvCxnSpPr>
-        <p:spPr>
-          <a:xfrm>
-            <a:off x="688765" y="1702676"/>
-            <a:ext cx="1413304" cy="0"/>
-          </a:xfrm>
-          <a:prstGeom prst="line">
-            <a:avLst/>
-          </a:prstGeom>
-          <a:ln>
-            <a:solidFill>
-              <a:schemeClr val="bg2">
-                <a:lumMod val="90000"/>
-              </a:schemeClr>
-            </a:solidFill>
-          </a:ln>
-        </p:spPr>
-        <p:style>
-          <a:lnRef idx="1">
-            <a:schemeClr val="accent1"/>
-          </a:lnRef>
-          <a:fillRef idx="0">
-            <a:schemeClr val="accent1"/>
-          </a:fillRef>
-          <a:effectRef idx="0">
-            <a:schemeClr val="accent1"/>
-          </a:effectRef>
-          <a:fontRef idx="minor">
-            <a:schemeClr val="tx1"/>
-          </a:fontRef>
-        </p:style>
-      </p:cxnSp>
-      <p:cxnSp>
-        <p:nvCxnSpPr>
-          <p:cNvPr id="23" name="Straight Connector 22">
-            <a:extLst>
-              <a:ext uri="{FF2B5EF4-FFF2-40B4-BE49-F238E27FC236}">
-                <a16:creationId xmlns:a16="http://schemas.microsoft.com/office/drawing/2014/main" id="{0B8F9D40-F887-E642-B110-4214281F3783}"/>
-              </a:ext>
-            </a:extLst>
-          </p:cNvPr>
-          <p:cNvCxnSpPr/>
-          <p:nvPr/>
-        </p:nvCxnSpPr>
-        <p:spPr>
-          <a:xfrm>
-            <a:off x="688765" y="1865586"/>
-            <a:ext cx="1413304" cy="0"/>
-          </a:xfrm>
-          <a:prstGeom prst="line">
-            <a:avLst/>
-          </a:prstGeom>
-          <a:ln>
-            <a:solidFill>
-              <a:schemeClr val="bg2">
-                <a:lumMod val="90000"/>
-              </a:schemeClr>
-            </a:solidFill>
-          </a:ln>
-        </p:spPr>
-        <p:style>
-          <a:lnRef idx="1">
-            <a:schemeClr val="accent1"/>
-          </a:lnRef>
-          <a:fillRef idx="0">
-            <a:schemeClr val="accent1"/>
-          </a:fillRef>
-          <a:effectRef idx="0">
-            <a:schemeClr val="accent1"/>
-          </a:effectRef>
-          <a:fontRef idx="minor">
-            <a:schemeClr val="tx1"/>
-          </a:fontRef>
-        </p:style>
-      </p:cxnSp>
-      <p:cxnSp>
-        <p:nvCxnSpPr>
-          <p:cNvPr id="24" name="Straight Connector 23">
-            <a:extLst>
-              <a:ext uri="{FF2B5EF4-FFF2-40B4-BE49-F238E27FC236}">
-                <a16:creationId xmlns:a16="http://schemas.microsoft.com/office/drawing/2014/main" id="{9E40DA10-1C0A-EC46-AC7B-85C965CA0B4F}"/>
-              </a:ext>
-            </a:extLst>
-          </p:cNvPr>
-          <p:cNvCxnSpPr/>
-          <p:nvPr/>
-        </p:nvCxnSpPr>
-        <p:spPr>
-          <a:xfrm>
-            <a:off x="688765" y="2033751"/>
-            <a:ext cx="1413304" cy="0"/>
-          </a:xfrm>
-          <a:prstGeom prst="line">
-            <a:avLst/>
-          </a:prstGeom>
-          <a:ln>
-            <a:solidFill>
-              <a:schemeClr val="bg2">
-                <a:lumMod val="90000"/>
-              </a:schemeClr>
-            </a:solidFill>
-          </a:ln>
-        </p:spPr>
-        <p:style>
-          <a:lnRef idx="1">
-            <a:schemeClr val="accent1"/>
-          </a:lnRef>
-          <a:fillRef idx="0">
-            <a:schemeClr val="accent1"/>
-          </a:fillRef>
-          <a:effectRef idx="0">
-            <a:schemeClr val="accent1"/>
-          </a:effectRef>
-          <a:fontRef idx="minor">
-            <a:schemeClr val="tx1"/>
-          </a:fontRef>
-        </p:style>
-      </p:cxnSp>
-      <p:cxnSp>
-        <p:nvCxnSpPr>
-          <p:cNvPr id="25" name="Straight Connector 24">
-            <a:extLst>
-              <a:ext uri="{FF2B5EF4-FFF2-40B4-BE49-F238E27FC236}">
-                <a16:creationId xmlns:a16="http://schemas.microsoft.com/office/drawing/2014/main" id="{1AF47BBD-83B3-B641-87CC-E6AA841F285E}"/>
-              </a:ext>
-            </a:extLst>
-          </p:cNvPr>
-          <p:cNvCxnSpPr/>
-          <p:nvPr/>
-        </p:nvCxnSpPr>
-        <p:spPr>
-          <a:xfrm>
-            <a:off x="685800" y="2175642"/>
-            <a:ext cx="1413304" cy="0"/>
-          </a:xfrm>
-          <a:prstGeom prst="line">
-            <a:avLst/>
-          </a:prstGeom>
-          <a:ln>
-            <a:solidFill>
-              <a:schemeClr val="bg2">
-                <a:lumMod val="90000"/>
-              </a:schemeClr>
-            </a:solidFill>
-          </a:ln>
-        </p:spPr>
-        <p:style>
-          <a:lnRef idx="1">
-            <a:schemeClr val="accent1"/>
-          </a:lnRef>
-          <a:fillRef idx="0">
-            <a:schemeClr val="accent1"/>
-          </a:fillRef>
-          <a:effectRef idx="0">
-            <a:schemeClr val="accent1"/>
-          </a:effectRef>
-          <a:fontRef idx="minor">
-            <a:schemeClr val="tx1"/>
-          </a:fontRef>
-        </p:style>
-      </p:cxnSp>
-      <p:cxnSp>
-        <p:nvCxnSpPr>
-          <p:cNvPr id="26" name="Straight Connector 25">
-            <a:extLst>
-              <a:ext uri="{FF2B5EF4-FFF2-40B4-BE49-F238E27FC236}">
-                <a16:creationId xmlns:a16="http://schemas.microsoft.com/office/drawing/2014/main" id="{9099DEF2-4FCF-C844-B250-B2D03C4CA025}"/>
-              </a:ext>
-            </a:extLst>
-          </p:cNvPr>
-          <p:cNvCxnSpPr/>
-          <p:nvPr/>
-        </p:nvCxnSpPr>
-        <p:spPr>
-          <a:xfrm>
-            <a:off x="685800" y="2338552"/>
-            <a:ext cx="1413304" cy="0"/>
-          </a:xfrm>
-          <a:prstGeom prst="line">
-            <a:avLst/>
-          </a:prstGeom>
-          <a:ln>
-            <a:solidFill>
-              <a:schemeClr val="bg2">
-                <a:lumMod val="90000"/>
-              </a:schemeClr>
-            </a:solidFill>
-          </a:ln>
-        </p:spPr>
-        <p:style>
-          <a:lnRef idx="1">
-            <a:schemeClr val="accent1"/>
-          </a:lnRef>
-          <a:fillRef idx="0">
-            <a:schemeClr val="accent1"/>
-          </a:fillRef>
-          <a:effectRef idx="0">
-            <a:schemeClr val="accent1"/>
-          </a:effectRef>
-          <a:fontRef idx="minor">
-            <a:schemeClr val="tx1"/>
-          </a:fontRef>
-        </p:style>
-      </p:cxnSp>
       <p:sp>
         <p:nvSpPr>
           <p:cNvPr id="31" name="10-Point Star 30">

</xml_diff>